<commit_message>
WIde logo fix (alignment)
</commit_message>
<xml_diff>
--- a/APKognito/Assets/Logos/APKognitoLogo.pptx
+++ b/APKognito/Assets/Logos/APKognitoLogo.pptx
@@ -3352,10 +3352,10 @@
       </p:grpSpPr>
       <p:grpSp>
         <p:nvGrpSpPr>
-          <p:cNvPr id="2" name="Group 1">
-            <a:extLst>
-              <a:ext uri="{FF2B5EF4-FFF2-40B4-BE49-F238E27FC236}">
-                <a16:creationId xmlns:a16="http://schemas.microsoft.com/office/drawing/2014/main" id="{FECBF665-995E-636B-9922-ED5BA659BAB8}"/>
+          <p:cNvPr id="3" name="Group 2">
+            <a:extLst>
+              <a:ext uri="{FF2B5EF4-FFF2-40B4-BE49-F238E27FC236}">
+                <a16:creationId xmlns:a16="http://schemas.microsoft.com/office/drawing/2014/main" id="{12BA3560-B1F2-B360-DA36-4ADE2F8DAE60}"/>
               </a:ext>
             </a:extLst>
           </p:cNvPr>
@@ -3364,10 +3364,10 @@
         </p:nvGrpSpPr>
         <p:grpSpPr>
           <a:xfrm>
-            <a:off x="1183697" y="1796173"/>
-            <a:ext cx="9824605" cy="3265654"/>
-            <a:chOff x="1877127" y="1796173"/>
-            <a:chExt cx="9824605" cy="3265654"/>
+            <a:off x="1550818" y="1796173"/>
+            <a:ext cx="9090363" cy="3265654"/>
+            <a:chOff x="1550818" y="1796173"/>
+            <a:chExt cx="9090363" cy="3265654"/>
           </a:xfrm>
         </p:grpSpPr>
         <p:pic>
@@ -3398,7 +3398,7 @@
           </p:blipFill>
           <p:spPr>
             <a:xfrm>
-              <a:off x="1877127" y="1796173"/>
+              <a:off x="1550818" y="1796173"/>
               <a:ext cx="3265654" cy="3265654"/>
             </a:xfrm>
             <a:prstGeom prst="rect">
@@ -3420,8 +3420,8 @@
           </p:nvSpPr>
           <p:spPr>
             <a:xfrm>
-              <a:off x="5142781" y="2644170"/>
-              <a:ext cx="6558951" cy="1569660"/>
+              <a:off x="4816472" y="2644170"/>
+              <a:ext cx="5824709" cy="1569660"/>
             </a:xfrm>
             <a:prstGeom prst="rect">
               <a:avLst/>
@@ -3434,6 +3434,7 @@
             </a:bodyPr>
             <a:lstStyle/>
             <a:p>
+              <a:pPr algn="ctr"/>
               <a:r>
                 <a:rPr lang="en-US" sz="9600" dirty="0" err="1">
                   <a:solidFill>
@@ -3803,10 +3804,10 @@
       </p:grpSpPr>
       <p:grpSp>
         <p:nvGrpSpPr>
-          <p:cNvPr id="2" name="Group 1">
-            <a:extLst>
-              <a:ext uri="{FF2B5EF4-FFF2-40B4-BE49-F238E27FC236}">
-                <a16:creationId xmlns:a16="http://schemas.microsoft.com/office/drawing/2014/main" id="{FECBF665-995E-636B-9922-ED5BA659BAB8}"/>
+          <p:cNvPr id="8" name="Group 7">
+            <a:extLst>
+              <a:ext uri="{FF2B5EF4-FFF2-40B4-BE49-F238E27FC236}">
+                <a16:creationId xmlns:a16="http://schemas.microsoft.com/office/drawing/2014/main" id="{A3381471-E0C9-2EFA-90A2-C6FEB5C37551}"/>
               </a:ext>
             </a:extLst>
           </p:cNvPr>
@@ -3815,10 +3816,10 @@
         </p:nvGrpSpPr>
         <p:grpSpPr>
           <a:xfrm>
-            <a:off x="1183697" y="1796173"/>
-            <a:ext cx="9824605" cy="3265654"/>
-            <a:chOff x="1877127" y="1796173"/>
-            <a:chExt cx="9824605" cy="3265654"/>
+            <a:off x="1550819" y="1796173"/>
+            <a:ext cx="9090362" cy="3265654"/>
+            <a:chOff x="1550819" y="1796173"/>
+            <a:chExt cx="9090362" cy="3265654"/>
           </a:xfrm>
         </p:grpSpPr>
         <p:pic>
@@ -3849,7 +3850,7 @@
           </p:blipFill>
           <p:spPr>
             <a:xfrm>
-              <a:off x="1877127" y="1796173"/>
+              <a:off x="1550819" y="1796173"/>
               <a:ext cx="3265654" cy="3265654"/>
             </a:xfrm>
             <a:prstGeom prst="rect">
@@ -3859,10 +3860,10 @@
         </p:pic>
         <p:sp>
           <p:nvSpPr>
-            <p:cNvPr id="6" name="TextBox 5">
+            <p:cNvPr id="7" name="TextBox 6">
               <a:extLst>
                 <a:ext uri="{FF2B5EF4-FFF2-40B4-BE49-F238E27FC236}">
-                  <a16:creationId xmlns:a16="http://schemas.microsoft.com/office/drawing/2014/main" id="{2DFC02CD-8895-A834-3AA3-8632498623DD}"/>
+                  <a16:creationId xmlns:a16="http://schemas.microsoft.com/office/drawing/2014/main" id="{C0614485-432B-01B5-12A9-41568C7D8257}"/>
                 </a:ext>
               </a:extLst>
             </p:cNvPr>
@@ -3871,8 +3872,8 @@
           </p:nvSpPr>
           <p:spPr>
             <a:xfrm>
-              <a:off x="5142781" y="2644170"/>
-              <a:ext cx="6558951" cy="1569660"/>
+              <a:off x="4816472" y="2644170"/>
+              <a:ext cx="5824709" cy="1569660"/>
             </a:xfrm>
             <a:prstGeom prst="rect">
               <a:avLst/>
@@ -3885,6 +3886,7 @@
             </a:bodyPr>
             <a:lstStyle/>
             <a:p>
+              <a:pPr algn="ctr"/>
               <a:r>
                 <a:rPr lang="en-US" sz="9600" dirty="0" err="1">
                   <a:latin typeface="Watatsuki Tech Sans" panose="02000703000000000000" pitchFamily="2" charset="0"/>

</xml_diff>